<commit_message>
Updated weekly event logos Oct 2018
</commit_message>
<xml_diff>
--- a/material_design/ResBazAZ_logos.pptx
+++ b/material_design/ResBazAZ_logos.pptx
@@ -201,7 +201,7 @@
           <a:p>
             <a:fld id="{050BB8F2-6FB3-D549-98D5-CA3C5C10F293}" type="datetimeFigureOut">
               <a:rPr lang="en-US" smtClean="0"/>
-              <a:t>9/14/16</a:t>
+              <a:t>10/14/18</a:t>
             </a:fld>
             <a:endParaRPr lang="en-US"/>
           </a:p>
@@ -265,38 +265,37 @@
           <a:p>
             <a:pPr lvl="0"/>
             <a:r>
-              <a:rPr lang="en-US" smtClean="0"/>
+              <a:rPr lang="en-US"/>
               <a:t>Click to edit Master text styles</a:t>
             </a:r>
           </a:p>
           <a:p>
             <a:pPr lvl="1"/>
             <a:r>
-              <a:rPr lang="en-US" smtClean="0"/>
+              <a:rPr lang="en-US"/>
               <a:t>Second level</a:t>
             </a:r>
           </a:p>
           <a:p>
             <a:pPr lvl="2"/>
             <a:r>
-              <a:rPr lang="en-US" smtClean="0"/>
+              <a:rPr lang="en-US"/>
               <a:t>Third level</a:t>
             </a:r>
           </a:p>
           <a:p>
             <a:pPr lvl="3"/>
             <a:r>
-              <a:rPr lang="en-US" smtClean="0"/>
+              <a:rPr lang="en-US"/>
               <a:t>Fourth level</a:t>
             </a:r>
           </a:p>
           <a:p>
             <a:pPr lvl="4"/>
             <a:r>
-              <a:rPr lang="en-US" smtClean="0"/>
+              <a:rPr lang="en-US"/>
               <a:t>Fifth level</a:t>
             </a:r>
-            <a:endParaRPr lang="en-US"/>
           </a:p>
         </p:txBody>
       </p:sp>
@@ -514,32 +513,32 @@
           <a:lstStyle/>
           <a:p>
             <a:r>
-              <a:rPr lang="en-US" dirty="0" smtClean="0"/>
+              <a:rPr lang="en-US" dirty="0"/>
               <a:t>Arizona up the Research Bazaar</a:t>
             </a:r>
             <a:r>
-              <a:rPr lang="en-US" baseline="0" dirty="0" smtClean="0"/>
+              <a:rPr lang="en-US" baseline="0" dirty="0"/>
               <a:t> square logo. This will be an alternate form of the longer Research Bazaar AZ logo with the Arizona flag</a:t>
             </a:r>
           </a:p>
           <a:p>
-            <a:endParaRPr lang="en-US" baseline="0" dirty="0" smtClean="0"/>
-          </a:p>
-          <a:p>
-            <a:r>
-              <a:rPr lang="en-US" baseline="0" dirty="0" smtClean="0"/>
+            <a:endParaRPr lang="en-US" baseline="0" dirty="0"/>
+          </a:p>
+          <a:p>
+            <a:r>
+              <a:rPr lang="en-US" baseline="0" dirty="0"/>
               <a:t>General ideas:</a:t>
             </a:r>
           </a:p>
           <a:p>
             <a:r>
-              <a:rPr lang="en-US" baseline="0" dirty="0" smtClean="0"/>
+              <a:rPr lang="en-US" baseline="0" dirty="0"/>
               <a:t>Change the 3 people to be more saguaro shaped? </a:t>
             </a:r>
           </a:p>
           <a:p>
             <a:r>
-              <a:rPr lang="en-US" baseline="0" dirty="0" smtClean="0"/>
+              <a:rPr lang="en-US" baseline="0" dirty="0"/>
               <a:t>Or add desert landscape behind people?</a:t>
             </a:r>
           </a:p>
@@ -626,54 +625,54 @@
           <a:lstStyle/>
           <a:p>
             <a:r>
-              <a:rPr lang="en-US" dirty="0" err="1" smtClean="0"/>
+              <a:rPr lang="en-US" dirty="0" err="1"/>
               <a:t>PhTea</a:t>
             </a:r>
             <a:r>
-              <a:rPr lang="en-US" dirty="0" smtClean="0"/>
+              <a:rPr lang="en-US" dirty="0"/>
               <a:t> is the morning/non-alcoholic version of Hacky Hour. It’d be great if they</a:t>
             </a:r>
             <a:r>
-              <a:rPr lang="en-US" baseline="0" dirty="0" smtClean="0"/>
+              <a:rPr lang="en-US" baseline="0" dirty="0"/>
               <a:t> shared some of the same esthetics. I really like how the Hacky Hour logo is atmospheric </a:t>
             </a:r>
-            <a:endParaRPr lang="en-US" dirty="0" smtClean="0"/>
-          </a:p>
-          <a:p>
-            <a:r>
-              <a:rPr lang="en-US" dirty="0" smtClean="0"/>
+            <a:endParaRPr lang="en-US" dirty="0"/>
+          </a:p>
+          <a:p>
+            <a:r>
+              <a:rPr lang="en-US" dirty="0"/>
               <a:t>Idea for the logo:</a:t>
             </a:r>
           </a:p>
           <a:p>
             <a:r>
-              <a:rPr lang="en-US" dirty="0" smtClean="0"/>
+              <a:rPr lang="en-US" dirty="0"/>
               <a:t>Tea field</a:t>
             </a:r>
             <a:r>
-              <a:rPr lang="en-US" baseline="0" dirty="0" smtClean="0"/>
+              <a:rPr lang="en-US" baseline="0" dirty="0"/>
               <a:t> and/or coffee field on the left. Farmer with </a:t>
             </a:r>
             <a:r>
-              <a:rPr lang="en-US" baseline="0" dirty="0" err="1" smtClean="0"/>
+              <a:rPr lang="en-US" baseline="0" dirty="0" err="1"/>
               <a:t>coffe</a:t>
             </a:r>
             <a:r>
-              <a:rPr lang="en-US" baseline="0" dirty="0" smtClean="0"/>
+              <a:rPr lang="en-US" baseline="0" dirty="0"/>
               <a:t>/tea dropping it into a cup.</a:t>
             </a:r>
           </a:p>
           <a:p>
             <a:r>
-              <a:rPr lang="en-US" baseline="0" dirty="0" smtClean="0"/>
+              <a:rPr lang="en-US" baseline="0" dirty="0"/>
               <a:t>On the right, the cup being held up by a researcher around a group of other researchers working together (a </a:t>
             </a:r>
             <a:r>
-              <a:rPr lang="en-US" baseline="0" dirty="0" err="1" smtClean="0"/>
+              <a:rPr lang="en-US" baseline="0" dirty="0" err="1"/>
               <a:t>lá</a:t>
             </a:r>
             <a:r>
-              <a:rPr lang="en-US" baseline="0" dirty="0" smtClean="0"/>
+              <a:rPr lang="en-US" baseline="0" dirty="0"/>
               <a:t> Hacky Hour Charlie’s Angels triplet)</a:t>
             </a:r>
             <a:endParaRPr lang="en-US" dirty="0"/>
@@ -761,66 +760,66 @@
           <a:lstStyle/>
           <a:p>
             <a:r>
-              <a:rPr lang="en-US" dirty="0" smtClean="0"/>
+              <a:rPr lang="en-US" dirty="0"/>
               <a:t>Charlie’s angels silhouette but</a:t>
             </a:r>
             <a:r>
-              <a:rPr lang="en-US" baseline="0" dirty="0" smtClean="0"/>
+              <a:rPr lang="en-US" baseline="0" dirty="0"/>
               <a:t> for Hacky Hour: main person working on a laptop, one side person drinking from a mug, one side a scientist. Hacky Hour in cool font across bottom to fit.</a:t>
             </a:r>
           </a:p>
           <a:p>
             <a:r>
-              <a:rPr lang="en-US" baseline="0" dirty="0" smtClean="0"/>
+              <a:rPr lang="en-US" baseline="0" dirty="0"/>
               <a:t>Thoughts:</a:t>
             </a:r>
           </a:p>
           <a:p>
             <a:r>
-              <a:rPr lang="en-US" baseline="0" dirty="0" smtClean="0"/>
+              <a:rPr lang="en-US" baseline="0" dirty="0"/>
               <a:t>Perhaps have ideas, data, experiments, code, </a:t>
             </a:r>
             <a:r>
-              <a:rPr lang="en-US" baseline="0" dirty="0" err="1" smtClean="0"/>
+              <a:rPr lang="en-US" baseline="0" dirty="0" err="1"/>
               <a:t>etc</a:t>
             </a:r>
             <a:r>
-              <a:rPr lang="en-US" baseline="0" dirty="0" smtClean="0"/>
+              <a:rPr lang="en-US" baseline="0" dirty="0"/>
               <a:t> coming out of it at the top.&lt;-These may relate to the 5 BIO5 topic areas: Pharmacy, Science, Agriculture, Engineering, Medicine. Consider including a </a:t>
             </a:r>
             <a:r>
-              <a:rPr lang="en-US" baseline="0" dirty="0" err="1" smtClean="0"/>
+              <a:rPr lang="en-US" baseline="0" dirty="0" err="1"/>
               <a:t>wug</a:t>
             </a:r>
             <a:r>
-              <a:rPr lang="en-US" baseline="0" dirty="0" smtClean="0"/>
+              <a:rPr lang="en-US" baseline="0" dirty="0"/>
               <a:t> walking around (https://</a:t>
             </a:r>
             <a:r>
-              <a:rPr lang="en-US" baseline="0" dirty="0" err="1" smtClean="0"/>
+              <a:rPr lang="en-US" baseline="0" dirty="0" err="1"/>
               <a:t>languagefix.files.wordpress.com</a:t>
             </a:r>
             <a:r>
-              <a:rPr lang="en-US" baseline="0" dirty="0" smtClean="0"/>
+              <a:rPr lang="en-US" baseline="0" dirty="0"/>
               <a:t>/2008/09/</a:t>
             </a:r>
             <a:r>
-              <a:rPr lang="en-US" baseline="0" dirty="0" err="1" smtClean="0"/>
+              <a:rPr lang="en-US" baseline="0" dirty="0" err="1"/>
               <a:t>wugbumper-full.jpg</a:t>
             </a:r>
             <a:r>
-              <a:rPr lang="en-US" baseline="0" dirty="0" smtClean="0"/>
+              <a:rPr lang="en-US" baseline="0" dirty="0"/>
               <a:t>)</a:t>
             </a:r>
           </a:p>
           <a:p>
             <a:r>
-              <a:rPr lang="en-US" baseline="0" dirty="0" smtClean="0"/>
+              <a:rPr lang="en-US" baseline="0" dirty="0"/>
               <a:t>Has to fit into a small square sometimes</a:t>
             </a:r>
           </a:p>
           <a:p>
-            <a:endParaRPr lang="en-US" baseline="0" dirty="0" smtClean="0"/>
+            <a:endParaRPr lang="en-US" baseline="0" dirty="0"/>
           </a:p>
         </p:txBody>
       </p:sp>
@@ -904,28 +903,28 @@
           <a:bodyPr/>
           <a:lstStyle/>
           <a:p>
-            <a:endParaRPr lang="en-US" dirty="0" smtClean="0"/>
-          </a:p>
-          <a:p>
-            <a:endParaRPr lang="en-US" dirty="0" smtClean="0"/>
-          </a:p>
-          <a:p>
-            <a:r>
-              <a:rPr lang="en-US" dirty="0" smtClean="0"/>
+            <a:endParaRPr lang="en-US" dirty="0"/>
+          </a:p>
+          <a:p>
+            <a:endParaRPr lang="en-US" dirty="0"/>
+          </a:p>
+          <a:p>
+            <a:r>
+              <a:rPr lang="en-US" dirty="0"/>
               <a:t>Shut</a:t>
             </a:r>
             <a:r>
-              <a:rPr lang="en-US" baseline="0" dirty="0" smtClean="0"/>
+              <a:rPr lang="en-US" baseline="0" dirty="0"/>
               <a:t> Off &amp; Write</a:t>
             </a:r>
           </a:p>
           <a:p>
             <a:r>
-              <a:rPr lang="en-US" dirty="0" smtClean="0"/>
+              <a:rPr lang="en-US" dirty="0"/>
               <a:t>Person pushing up against a semi-closed</a:t>
             </a:r>
             <a:r>
-              <a:rPr lang="en-US" baseline="0" dirty="0" smtClean="0"/>
+              <a:rPr lang="en-US" baseline="0" dirty="0"/>
               <a:t> door with things like emails, twitter symbols, otherwise popping through the last bit of unclosed door. A group of people sitting together and working/writing on laptops. Same group as Hacky Hour but turned inwards toward each other instead of outward.</a:t>
             </a:r>
             <a:endParaRPr lang="en-US" dirty="0"/>
@@ -1010,10 +1009,9 @@
           </a:lstStyle>
           <a:p>
             <a:r>
-              <a:rPr lang="en-US" smtClean="0"/>
+              <a:rPr lang="en-US"/>
               <a:t>Click to edit Master title style</a:t>
             </a:r>
-            <a:endParaRPr lang="en-US"/>
           </a:p>
         </p:txBody>
       </p:sp>
@@ -1075,10 +1073,9 @@
           </a:lstStyle>
           <a:p>
             <a:r>
-              <a:rPr lang="en-US" smtClean="0"/>
+              <a:rPr lang="en-US"/>
               <a:t>Click to edit Master subtitle style</a:t>
             </a:r>
-            <a:endParaRPr lang="en-US"/>
           </a:p>
         </p:txBody>
       </p:sp>
@@ -1099,7 +1096,7 @@
           <a:p>
             <a:fld id="{85FD0578-078D-BE4C-8961-5BD432D3B829}" type="datetimeFigureOut">
               <a:rPr lang="en-US" smtClean="0"/>
-              <a:t>9/14/16</a:t>
+              <a:t>10/14/18</a:t>
             </a:fld>
             <a:endParaRPr lang="en-US"/>
           </a:p>
@@ -1193,10 +1190,9 @@
           <a:lstStyle/>
           <a:p>
             <a:r>
-              <a:rPr lang="en-US" smtClean="0"/>
+              <a:rPr lang="en-US"/>
               <a:t>Click to edit Master title style</a:t>
             </a:r>
-            <a:endParaRPr lang="en-US"/>
           </a:p>
         </p:txBody>
       </p:sp>
@@ -1217,38 +1213,37 @@
           <a:p>
             <a:pPr lvl="0"/>
             <a:r>
-              <a:rPr lang="en-US" smtClean="0"/>
+              <a:rPr lang="en-US"/>
               <a:t>Click to edit Master text styles</a:t>
             </a:r>
           </a:p>
           <a:p>
             <a:pPr lvl="1"/>
             <a:r>
-              <a:rPr lang="en-US" smtClean="0"/>
+              <a:rPr lang="en-US"/>
               <a:t>Second level</a:t>
             </a:r>
           </a:p>
           <a:p>
             <a:pPr lvl="2"/>
             <a:r>
-              <a:rPr lang="en-US" smtClean="0"/>
+              <a:rPr lang="en-US"/>
               <a:t>Third level</a:t>
             </a:r>
           </a:p>
           <a:p>
             <a:pPr lvl="3"/>
             <a:r>
-              <a:rPr lang="en-US" smtClean="0"/>
+              <a:rPr lang="en-US"/>
               <a:t>Fourth level</a:t>
             </a:r>
           </a:p>
           <a:p>
             <a:pPr lvl="4"/>
             <a:r>
-              <a:rPr lang="en-US" smtClean="0"/>
+              <a:rPr lang="en-US"/>
               <a:t>Fifth level</a:t>
             </a:r>
-            <a:endParaRPr lang="en-US"/>
           </a:p>
         </p:txBody>
       </p:sp>
@@ -1269,7 +1264,7 @@
           <a:p>
             <a:fld id="{85FD0578-078D-BE4C-8961-5BD432D3B829}" type="datetimeFigureOut">
               <a:rPr lang="en-US" smtClean="0"/>
-              <a:t>9/14/16</a:t>
+              <a:t>10/14/18</a:t>
             </a:fld>
             <a:endParaRPr lang="en-US"/>
           </a:p>
@@ -1368,10 +1363,9 @@
           <a:lstStyle/>
           <a:p>
             <a:r>
-              <a:rPr lang="en-US" smtClean="0"/>
+              <a:rPr lang="en-US"/>
               <a:t>Click to edit Master title style</a:t>
             </a:r>
-            <a:endParaRPr lang="en-US"/>
           </a:p>
         </p:txBody>
       </p:sp>
@@ -1397,38 +1391,37 @@
           <a:p>
             <a:pPr lvl="0"/>
             <a:r>
-              <a:rPr lang="en-US" smtClean="0"/>
+              <a:rPr lang="en-US"/>
               <a:t>Click to edit Master text styles</a:t>
             </a:r>
           </a:p>
           <a:p>
             <a:pPr lvl="1"/>
             <a:r>
-              <a:rPr lang="en-US" smtClean="0"/>
+              <a:rPr lang="en-US"/>
               <a:t>Second level</a:t>
             </a:r>
           </a:p>
           <a:p>
             <a:pPr lvl="2"/>
             <a:r>
-              <a:rPr lang="en-US" smtClean="0"/>
+              <a:rPr lang="en-US"/>
               <a:t>Third level</a:t>
             </a:r>
           </a:p>
           <a:p>
             <a:pPr lvl="3"/>
             <a:r>
-              <a:rPr lang="en-US" smtClean="0"/>
+              <a:rPr lang="en-US"/>
               <a:t>Fourth level</a:t>
             </a:r>
           </a:p>
           <a:p>
             <a:pPr lvl="4"/>
             <a:r>
-              <a:rPr lang="en-US" smtClean="0"/>
+              <a:rPr lang="en-US"/>
               <a:t>Fifth level</a:t>
             </a:r>
-            <a:endParaRPr lang="en-US"/>
           </a:p>
         </p:txBody>
       </p:sp>
@@ -1449,7 +1442,7 @@
           <a:p>
             <a:fld id="{85FD0578-078D-BE4C-8961-5BD432D3B829}" type="datetimeFigureOut">
               <a:rPr lang="en-US" smtClean="0"/>
-              <a:t>9/14/16</a:t>
+              <a:t>10/14/18</a:t>
             </a:fld>
             <a:endParaRPr lang="en-US"/>
           </a:p>
@@ -1543,10 +1536,9 @@
           <a:lstStyle/>
           <a:p>
             <a:r>
-              <a:rPr lang="en-US" smtClean="0"/>
+              <a:rPr lang="en-US"/>
               <a:t>Click to edit Master title style</a:t>
             </a:r>
-            <a:endParaRPr lang="en-US"/>
           </a:p>
         </p:txBody>
       </p:sp>
@@ -1567,38 +1559,37 @@
           <a:p>
             <a:pPr lvl="0"/>
             <a:r>
-              <a:rPr lang="en-US" smtClean="0"/>
+              <a:rPr lang="en-US"/>
               <a:t>Click to edit Master text styles</a:t>
             </a:r>
           </a:p>
           <a:p>
             <a:pPr lvl="1"/>
             <a:r>
-              <a:rPr lang="en-US" smtClean="0"/>
+              <a:rPr lang="en-US"/>
               <a:t>Second level</a:t>
             </a:r>
           </a:p>
           <a:p>
             <a:pPr lvl="2"/>
             <a:r>
-              <a:rPr lang="en-US" smtClean="0"/>
+              <a:rPr lang="en-US"/>
               <a:t>Third level</a:t>
             </a:r>
           </a:p>
           <a:p>
             <a:pPr lvl="3"/>
             <a:r>
-              <a:rPr lang="en-US" smtClean="0"/>
+              <a:rPr lang="en-US"/>
               <a:t>Fourth level</a:t>
             </a:r>
           </a:p>
           <a:p>
             <a:pPr lvl="4"/>
             <a:r>
-              <a:rPr lang="en-US" smtClean="0"/>
+              <a:rPr lang="en-US"/>
               <a:t>Fifth level</a:t>
             </a:r>
-            <a:endParaRPr lang="en-US"/>
           </a:p>
         </p:txBody>
       </p:sp>
@@ -1619,7 +1610,7 @@
           <a:p>
             <a:fld id="{85FD0578-078D-BE4C-8961-5BD432D3B829}" type="datetimeFigureOut">
               <a:rPr lang="en-US" smtClean="0"/>
-              <a:t>9/14/16</a:t>
+              <a:t>10/14/18</a:t>
             </a:fld>
             <a:endParaRPr lang="en-US"/>
           </a:p>
@@ -1722,10 +1713,9 @@
           </a:lstStyle>
           <a:p>
             <a:r>
-              <a:rPr lang="en-US" smtClean="0"/>
+              <a:rPr lang="en-US"/>
               <a:t>Click to edit Master title style</a:t>
             </a:r>
-            <a:endParaRPr lang="en-US"/>
           </a:p>
         </p:txBody>
       </p:sp>
@@ -1842,7 +1832,7 @@
           <a:p>
             <a:pPr lvl="0"/>
             <a:r>
-              <a:rPr lang="en-US" smtClean="0"/>
+              <a:rPr lang="en-US"/>
               <a:t>Click to edit Master text styles</a:t>
             </a:r>
           </a:p>
@@ -1865,7 +1855,7 @@
           <a:p>
             <a:fld id="{85FD0578-078D-BE4C-8961-5BD432D3B829}" type="datetimeFigureOut">
               <a:rPr lang="en-US" smtClean="0"/>
-              <a:t>9/14/16</a:t>
+              <a:t>10/14/18</a:t>
             </a:fld>
             <a:endParaRPr lang="en-US"/>
           </a:p>
@@ -1959,10 +1949,9 @@
           <a:lstStyle/>
           <a:p>
             <a:r>
-              <a:rPr lang="en-US" smtClean="0"/>
+              <a:rPr lang="en-US"/>
               <a:t>Click to edit Master title style</a:t>
             </a:r>
-            <a:endParaRPr lang="en-US"/>
           </a:p>
         </p:txBody>
       </p:sp>
@@ -1988,38 +1977,37 @@
           <a:p>
             <a:pPr lvl="0"/>
             <a:r>
-              <a:rPr lang="en-US" smtClean="0"/>
+              <a:rPr lang="en-US"/>
               <a:t>Click to edit Master text styles</a:t>
             </a:r>
           </a:p>
           <a:p>
             <a:pPr lvl="1"/>
             <a:r>
-              <a:rPr lang="en-US" smtClean="0"/>
+              <a:rPr lang="en-US"/>
               <a:t>Second level</a:t>
             </a:r>
           </a:p>
           <a:p>
             <a:pPr lvl="2"/>
             <a:r>
-              <a:rPr lang="en-US" smtClean="0"/>
+              <a:rPr lang="en-US"/>
               <a:t>Third level</a:t>
             </a:r>
           </a:p>
           <a:p>
             <a:pPr lvl="3"/>
             <a:r>
-              <a:rPr lang="en-US" smtClean="0"/>
+              <a:rPr lang="en-US"/>
               <a:t>Fourth level</a:t>
             </a:r>
           </a:p>
           <a:p>
             <a:pPr lvl="4"/>
             <a:r>
-              <a:rPr lang="en-US" smtClean="0"/>
+              <a:rPr lang="en-US"/>
               <a:t>Fifth level</a:t>
             </a:r>
-            <a:endParaRPr lang="en-US"/>
           </a:p>
         </p:txBody>
       </p:sp>
@@ -2045,38 +2033,37 @@
           <a:p>
             <a:pPr lvl="0"/>
             <a:r>
-              <a:rPr lang="en-US" smtClean="0"/>
+              <a:rPr lang="en-US"/>
               <a:t>Click to edit Master text styles</a:t>
             </a:r>
           </a:p>
           <a:p>
             <a:pPr lvl="1"/>
             <a:r>
-              <a:rPr lang="en-US" smtClean="0"/>
+              <a:rPr lang="en-US"/>
               <a:t>Second level</a:t>
             </a:r>
           </a:p>
           <a:p>
             <a:pPr lvl="2"/>
             <a:r>
-              <a:rPr lang="en-US" smtClean="0"/>
+              <a:rPr lang="en-US"/>
               <a:t>Third level</a:t>
             </a:r>
           </a:p>
           <a:p>
             <a:pPr lvl="3"/>
             <a:r>
-              <a:rPr lang="en-US" smtClean="0"/>
+              <a:rPr lang="en-US"/>
               <a:t>Fourth level</a:t>
             </a:r>
           </a:p>
           <a:p>
             <a:pPr lvl="4"/>
             <a:r>
-              <a:rPr lang="en-US" smtClean="0"/>
+              <a:rPr lang="en-US"/>
               <a:t>Fifth level</a:t>
             </a:r>
-            <a:endParaRPr lang="en-US"/>
           </a:p>
         </p:txBody>
       </p:sp>
@@ -2097,7 +2084,7 @@
           <a:p>
             <a:fld id="{85FD0578-078D-BE4C-8961-5BD432D3B829}" type="datetimeFigureOut">
               <a:rPr lang="en-US" smtClean="0"/>
-              <a:t>9/14/16</a:t>
+              <a:t>10/14/18</a:t>
             </a:fld>
             <a:endParaRPr lang="en-US"/>
           </a:p>
@@ -2196,10 +2183,9 @@
           <a:lstStyle/>
           <a:p>
             <a:r>
-              <a:rPr lang="en-US" smtClean="0"/>
+              <a:rPr lang="en-US"/>
               <a:t>Click to edit Master title style</a:t>
             </a:r>
-            <a:endParaRPr lang="en-US"/>
           </a:p>
         </p:txBody>
       </p:sp>
@@ -2262,7 +2248,7 @@
           <a:p>
             <a:pPr lvl="0"/>
             <a:r>
-              <a:rPr lang="en-US" smtClean="0"/>
+              <a:rPr lang="en-US"/>
               <a:t>Click to edit Master text styles</a:t>
             </a:r>
           </a:p>
@@ -2290,38 +2276,37 @@
           <a:p>
             <a:pPr lvl="0"/>
             <a:r>
-              <a:rPr lang="en-US" smtClean="0"/>
+              <a:rPr lang="en-US"/>
               <a:t>Click to edit Master text styles</a:t>
             </a:r>
           </a:p>
           <a:p>
             <a:pPr lvl="1"/>
             <a:r>
-              <a:rPr lang="en-US" smtClean="0"/>
+              <a:rPr lang="en-US"/>
               <a:t>Second level</a:t>
             </a:r>
           </a:p>
           <a:p>
             <a:pPr lvl="2"/>
             <a:r>
-              <a:rPr lang="en-US" smtClean="0"/>
+              <a:rPr lang="en-US"/>
               <a:t>Third level</a:t>
             </a:r>
           </a:p>
           <a:p>
             <a:pPr lvl="3"/>
             <a:r>
-              <a:rPr lang="en-US" smtClean="0"/>
+              <a:rPr lang="en-US"/>
               <a:t>Fourth level</a:t>
             </a:r>
           </a:p>
           <a:p>
             <a:pPr lvl="4"/>
             <a:r>
-              <a:rPr lang="en-US" smtClean="0"/>
+              <a:rPr lang="en-US"/>
               <a:t>Fifth level</a:t>
             </a:r>
-            <a:endParaRPr lang="en-US"/>
           </a:p>
         </p:txBody>
       </p:sp>
@@ -2384,7 +2369,7 @@
           <a:p>
             <a:pPr lvl="0"/>
             <a:r>
-              <a:rPr lang="en-US" smtClean="0"/>
+              <a:rPr lang="en-US"/>
               <a:t>Click to edit Master text styles</a:t>
             </a:r>
           </a:p>
@@ -2412,38 +2397,37 @@
           <a:p>
             <a:pPr lvl="0"/>
             <a:r>
-              <a:rPr lang="en-US" smtClean="0"/>
+              <a:rPr lang="en-US"/>
               <a:t>Click to edit Master text styles</a:t>
             </a:r>
           </a:p>
           <a:p>
             <a:pPr lvl="1"/>
             <a:r>
-              <a:rPr lang="en-US" smtClean="0"/>
+              <a:rPr lang="en-US"/>
               <a:t>Second level</a:t>
             </a:r>
           </a:p>
           <a:p>
             <a:pPr lvl="2"/>
             <a:r>
-              <a:rPr lang="en-US" smtClean="0"/>
+              <a:rPr lang="en-US"/>
               <a:t>Third level</a:t>
             </a:r>
           </a:p>
           <a:p>
             <a:pPr lvl="3"/>
             <a:r>
-              <a:rPr lang="en-US" smtClean="0"/>
+              <a:rPr lang="en-US"/>
               <a:t>Fourth level</a:t>
             </a:r>
           </a:p>
           <a:p>
             <a:pPr lvl="4"/>
             <a:r>
-              <a:rPr lang="en-US" smtClean="0"/>
+              <a:rPr lang="en-US"/>
               <a:t>Fifth level</a:t>
             </a:r>
-            <a:endParaRPr lang="en-US"/>
           </a:p>
         </p:txBody>
       </p:sp>
@@ -2464,7 +2448,7 @@
           <a:p>
             <a:fld id="{85FD0578-078D-BE4C-8961-5BD432D3B829}" type="datetimeFigureOut">
               <a:rPr lang="en-US" smtClean="0"/>
-              <a:t>9/14/16</a:t>
+              <a:t>10/14/18</a:t>
             </a:fld>
             <a:endParaRPr lang="en-US"/>
           </a:p>
@@ -2558,10 +2542,9 @@
           <a:lstStyle/>
           <a:p>
             <a:r>
-              <a:rPr lang="en-US" smtClean="0"/>
+              <a:rPr lang="en-US"/>
               <a:t>Click to edit Master title style</a:t>
             </a:r>
-            <a:endParaRPr lang="en-US"/>
           </a:p>
         </p:txBody>
       </p:sp>
@@ -2582,7 +2565,7 @@
           <a:p>
             <a:fld id="{85FD0578-078D-BE4C-8961-5BD432D3B829}" type="datetimeFigureOut">
               <a:rPr lang="en-US" smtClean="0"/>
-              <a:t>9/14/16</a:t>
+              <a:t>10/14/18</a:t>
             </a:fld>
             <a:endParaRPr lang="en-US"/>
           </a:p>
@@ -2677,7 +2660,7 @@
           <a:p>
             <a:fld id="{85FD0578-078D-BE4C-8961-5BD432D3B829}" type="datetimeFigureOut">
               <a:rPr lang="en-US" smtClean="0"/>
-              <a:t>9/14/16</a:t>
+              <a:t>10/14/18</a:t>
             </a:fld>
             <a:endParaRPr lang="en-US"/>
           </a:p>
@@ -2780,10 +2763,9 @@
           </a:lstStyle>
           <a:p>
             <a:r>
-              <a:rPr lang="en-US" smtClean="0"/>
+              <a:rPr lang="en-US"/>
               <a:t>Click to edit Master title style</a:t>
             </a:r>
-            <a:endParaRPr lang="en-US"/>
           </a:p>
         </p:txBody>
       </p:sp>
@@ -2837,38 +2819,37 @@
           <a:p>
             <a:pPr lvl="0"/>
             <a:r>
-              <a:rPr lang="en-US" smtClean="0"/>
+              <a:rPr lang="en-US"/>
               <a:t>Click to edit Master text styles</a:t>
             </a:r>
           </a:p>
           <a:p>
             <a:pPr lvl="1"/>
             <a:r>
-              <a:rPr lang="en-US" smtClean="0"/>
+              <a:rPr lang="en-US"/>
               <a:t>Second level</a:t>
             </a:r>
           </a:p>
           <a:p>
             <a:pPr lvl="2"/>
             <a:r>
-              <a:rPr lang="en-US" smtClean="0"/>
+              <a:rPr lang="en-US"/>
               <a:t>Third level</a:t>
             </a:r>
           </a:p>
           <a:p>
             <a:pPr lvl="3"/>
             <a:r>
-              <a:rPr lang="en-US" smtClean="0"/>
+              <a:rPr lang="en-US"/>
               <a:t>Fourth level</a:t>
             </a:r>
           </a:p>
           <a:p>
             <a:pPr lvl="4"/>
             <a:r>
-              <a:rPr lang="en-US" smtClean="0"/>
+              <a:rPr lang="en-US"/>
               <a:t>Fifth level</a:t>
             </a:r>
-            <a:endParaRPr lang="en-US"/>
           </a:p>
         </p:txBody>
       </p:sp>
@@ -2931,7 +2912,7 @@
           <a:p>
             <a:pPr lvl="0"/>
             <a:r>
-              <a:rPr lang="en-US" smtClean="0"/>
+              <a:rPr lang="en-US"/>
               <a:t>Click to edit Master text styles</a:t>
             </a:r>
           </a:p>
@@ -2954,7 +2935,7 @@
           <a:p>
             <a:fld id="{85FD0578-078D-BE4C-8961-5BD432D3B829}" type="datetimeFigureOut">
               <a:rPr lang="en-US" smtClean="0"/>
-              <a:t>9/14/16</a:t>
+              <a:t>10/14/18</a:t>
             </a:fld>
             <a:endParaRPr lang="en-US"/>
           </a:p>
@@ -3057,10 +3038,9 @@
           </a:lstStyle>
           <a:p>
             <a:r>
-              <a:rPr lang="en-US" smtClean="0"/>
+              <a:rPr lang="en-US"/>
               <a:t>Click to edit Master title style</a:t>
             </a:r>
-            <a:endParaRPr lang="en-US"/>
           </a:p>
         </p:txBody>
       </p:sp>
@@ -3184,7 +3164,7 @@
           <a:p>
             <a:pPr lvl="0"/>
             <a:r>
-              <a:rPr lang="en-US" smtClean="0"/>
+              <a:rPr lang="en-US"/>
               <a:t>Click to edit Master text styles</a:t>
             </a:r>
           </a:p>
@@ -3207,7 +3187,7 @@
           <a:p>
             <a:fld id="{85FD0578-078D-BE4C-8961-5BD432D3B829}" type="datetimeFigureOut">
               <a:rPr lang="en-US" smtClean="0"/>
-              <a:t>9/14/16</a:t>
+              <a:t>10/14/18</a:t>
             </a:fld>
             <a:endParaRPr lang="en-US"/>
           </a:p>
@@ -3316,10 +3296,9 @@
           <a:lstStyle/>
           <a:p>
             <a:r>
-              <a:rPr lang="en-US" smtClean="0"/>
+              <a:rPr lang="en-US"/>
               <a:t>Click to edit Master title style</a:t>
             </a:r>
-            <a:endParaRPr lang="en-US"/>
           </a:p>
         </p:txBody>
       </p:sp>
@@ -3350,38 +3329,37 @@
           <a:p>
             <a:pPr lvl="0"/>
             <a:r>
-              <a:rPr lang="en-US" smtClean="0"/>
+              <a:rPr lang="en-US"/>
               <a:t>Click to edit Master text styles</a:t>
             </a:r>
           </a:p>
           <a:p>
             <a:pPr lvl="1"/>
             <a:r>
-              <a:rPr lang="en-US" smtClean="0"/>
+              <a:rPr lang="en-US"/>
               <a:t>Second level</a:t>
             </a:r>
           </a:p>
           <a:p>
             <a:pPr lvl="2"/>
             <a:r>
-              <a:rPr lang="en-US" smtClean="0"/>
+              <a:rPr lang="en-US"/>
               <a:t>Third level</a:t>
             </a:r>
           </a:p>
           <a:p>
             <a:pPr lvl="3"/>
             <a:r>
-              <a:rPr lang="en-US" smtClean="0"/>
+              <a:rPr lang="en-US"/>
               <a:t>Fourth level</a:t>
             </a:r>
           </a:p>
           <a:p>
             <a:pPr lvl="4"/>
             <a:r>
-              <a:rPr lang="en-US" smtClean="0"/>
+              <a:rPr lang="en-US"/>
               <a:t>Fifth level</a:t>
             </a:r>
-            <a:endParaRPr lang="en-US"/>
           </a:p>
         </p:txBody>
       </p:sp>
@@ -3420,7 +3398,7 @@
           <a:p>
             <a:fld id="{85FD0578-078D-BE4C-8961-5BD432D3B829}" type="datetimeFigureOut">
               <a:rPr lang="en-US" smtClean="0"/>
-              <a:t>9/14/16</a:t>
+              <a:t>10/14/18</a:t>
             </a:fld>
             <a:endParaRPr lang="en-US"/>
           </a:p>
@@ -3848,10 +3826,9 @@
           <a:lstStyle/>
           <a:p>
             <a:r>
-              <a:rPr lang="en-US" dirty="0" smtClean="0"/>
+              <a:rPr lang="en-US" dirty="0"/>
               <a:t>Square Logo</a:t>
             </a:r>
-            <a:endParaRPr lang="en-US" dirty="0"/>
           </a:p>
         </p:txBody>
       </p:sp>
@@ -4168,13 +4145,6 @@
   <p:clrMapOvr>
     <a:masterClrMapping/>
   </p:clrMapOvr>
-  <p:timing>
-    <p:tnLst>
-      <p:par>
-        <p:cTn id="1" dur="indefinite" restart="never" nodeType="tmRoot"/>
-      </p:par>
-    </p:tnLst>
-  </p:timing>
 </p:sld>
 </file>
 
@@ -4219,32 +4189,23 @@
           <a:p>
             <a:pPr algn="ctr"/>
             <a:r>
-              <a:rPr lang="en-US" dirty="0" err="1" smtClean="0"/>
+              <a:rPr lang="en-US" dirty="0" err="1"/>
               <a:t>PhTea</a:t>
             </a:r>
-            <a:r>
-              <a:rPr lang="en-US" dirty="0" smtClean="0"/>
-              <a:t/>
-            </a:r>
             <a:br>
-              <a:rPr lang="en-US" dirty="0" smtClean="0"/>
+              <a:rPr lang="en-US" dirty="0"/>
             </a:br>
             <a:r>
-              <a:rPr lang="en-US" sz="1400" dirty="0" smtClean="0"/>
+              <a:rPr lang="en-US" sz="1400" dirty="0"/>
               <a:t>Pharmacy | Science | Agriculture | Engineering | Medicine</a:t>
             </a:r>
-            <a:r>
-              <a:rPr lang="en-US" dirty="0" smtClean="0"/>
-              <a:t/>
-            </a:r>
             <a:br>
-              <a:rPr lang="en-US" dirty="0" smtClean="0"/>
+              <a:rPr lang="en-US" dirty="0"/>
             </a:br>
             <a:r>
-              <a:rPr lang="en-US" sz="2800" dirty="0" smtClean="0"/>
+              <a:rPr lang="en-US" sz="2800" dirty="0"/>
               <a:t>Uniting Worlds</a:t>
             </a:r>
-            <a:endParaRPr lang="en-US" sz="2800" dirty="0"/>
           </a:p>
         </p:txBody>
       </p:sp>
@@ -4455,10 +4416,9 @@
           <a:lstStyle/>
           <a:p>
             <a:r>
-              <a:rPr lang="en-US" sz="2400" dirty="0" smtClean="0"/>
+              <a:rPr lang="en-US" sz="2400" dirty="0"/>
               <a:t>Solving Problems</a:t>
             </a:r>
-            <a:endParaRPr lang="en-US" sz="2400" dirty="0"/>
           </a:p>
         </p:txBody>
       </p:sp>
@@ -4655,13 +4615,6 @@
   <p:clrMapOvr>
     <a:masterClrMapping/>
   </p:clrMapOvr>
-  <p:timing>
-    <p:tnLst>
-      <p:par>
-        <p:cTn id="1" dur="indefinite" restart="never" nodeType="tmRoot"/>
-      </p:par>
-    </p:tnLst>
-  </p:timing>
 </p:sld>
 </file>
 
@@ -4703,10 +4656,9 @@
           <a:lstStyle/>
           <a:p>
             <a:r>
-              <a:rPr lang="en-US" dirty="0" smtClean="0"/>
+              <a:rPr lang="en-US" dirty="0"/>
               <a:t>Hacky Hour</a:t>
             </a:r>
-            <a:endParaRPr lang="en-US" dirty="0"/>
           </a:p>
         </p:txBody>
       </p:sp>
@@ -4813,10 +4765,9 @@
           <a:lstStyle/>
           <a:p>
             <a:r>
-              <a:rPr lang="en-US" dirty="0" smtClean="0"/>
+              <a:rPr lang="en-US" dirty="0"/>
               <a:t>Inspiration</a:t>
             </a:r>
-            <a:endParaRPr lang="en-US" dirty="0"/>
           </a:p>
         </p:txBody>
       </p:sp>
@@ -4924,17 +4875,16 @@
           <a:p>
             <a:pPr algn="ctr"/>
             <a:r>
-              <a:rPr lang="en-US" sz="3200" spc="600" dirty="0" smtClean="0"/>
+              <a:rPr lang="en-US" sz="3200" spc="600" dirty="0"/>
               <a:t>Hacky</a:t>
             </a:r>
           </a:p>
           <a:p>
             <a:pPr algn="ctr"/>
             <a:r>
-              <a:rPr lang="en-US" sz="3200" spc="600" dirty="0" smtClean="0"/>
+              <a:rPr lang="en-US" sz="3200" spc="600" dirty="0"/>
               <a:t>Hour</a:t>
             </a:r>
-            <a:endParaRPr lang="en-US" sz="3200" spc="600" dirty="0"/>
           </a:p>
         </p:txBody>
       </p:sp>
@@ -4991,10 +4941,9 @@
           <a:lstStyle/>
           <a:p>
             <a:r>
-              <a:rPr lang="en-US" smtClean="0"/>
+              <a:rPr lang="en-US"/>
               <a:t>Mock Up</a:t>
             </a:r>
-            <a:endParaRPr lang="en-US"/>
           </a:p>
         </p:txBody>
       </p:sp>
@@ -5021,10 +4970,9 @@
           <a:lstStyle/>
           <a:p>
             <a:r>
-              <a:rPr lang="en-US" smtClean="0"/>
+              <a:rPr lang="en-US"/>
               <a:t>Mariah’s Final </a:t>
             </a:r>
-            <a:endParaRPr lang="en-US"/>
           </a:p>
         </p:txBody>
       </p:sp>
@@ -5038,13 +4986,6 @@
   <p:clrMapOvr>
     <a:masterClrMapping/>
   </p:clrMapOvr>
-  <p:timing>
-    <p:tnLst>
-      <p:par>
-        <p:cTn id="1" dur="indefinite" restart="never" nodeType="tmRoot"/>
-      </p:par>
-    </p:tnLst>
-  </p:timing>
 </p:sld>
 </file>
 
@@ -5086,11 +5027,11 @@
           <a:lstStyle/>
           <a:p>
             <a:r>
-              <a:rPr lang="en-US" dirty="0" smtClean="0"/>
+              <a:rPr lang="en-US" dirty="0"/>
               <a:t>Shut Up &amp; Write </a:t>
             </a:r>
             <a:r>
-              <a:rPr lang="en-US" dirty="0" smtClean="0">
+              <a:rPr lang="en-US" dirty="0">
                 <a:sym typeface="Wingdings"/>
               </a:rPr>
               <a:t> Shut Off &amp; Write?</a:t>
@@ -5224,10 +5165,9 @@
             <a:lstStyle/>
             <a:p>
               <a:r>
-                <a:rPr lang="en-US" sz="2400" dirty="0" smtClean="0"/>
+                <a:rPr lang="en-US" sz="2400" dirty="0"/>
                 <a:t>Unplug. Dig In.</a:t>
               </a:r>
-              <a:endParaRPr lang="en-US" sz="2400" dirty="0"/>
             </a:p>
           </p:txBody>
         </p:sp>
@@ -5257,14 +5197,7 @@
                   <a:ln w="0"/>
                   <a:sym typeface="Wingdings"/>
                 </a:rPr>
-                <a:t>Shut Off &amp; </a:t>
-              </a:r>
-              <a:r>
-                <a:rPr lang="en-US" sz="2800" dirty="0" smtClean="0">
-                  <a:ln w="0"/>
-                  <a:sym typeface="Wingdings"/>
-                </a:rPr>
-                <a:t>Write</a:t>
+                <a:t>Shut Off &amp; Write</a:t>
               </a:r>
               <a:endParaRPr lang="en-US" sz="2800" dirty="0">
                 <a:ln w="0"/>
@@ -5828,6 +5761,214 @@
           </a:p>
         </p:txBody>
       </p:sp>
+      <p:grpSp>
+        <p:nvGrpSpPr>
+          <p:cNvPr id="2" name="Group 1">
+            <a:extLst>
+              <a:ext uri="{FF2B5EF4-FFF2-40B4-BE49-F238E27FC236}">
+                <a16:creationId xmlns:a16="http://schemas.microsoft.com/office/drawing/2014/main" id="{C7791DDF-61BF-454B-B295-C499C529628C}"/>
+              </a:ext>
+            </a:extLst>
+          </p:cNvPr>
+          <p:cNvGrpSpPr/>
+          <p:nvPr/>
+        </p:nvGrpSpPr>
+        <p:grpSpPr>
+          <a:xfrm>
+            <a:off x="4242142" y="1405"/>
+            <a:ext cx="5374088" cy="6856595"/>
+            <a:chOff x="4242142" y="1405"/>
+            <a:chExt cx="5374088" cy="6856595"/>
+          </a:xfrm>
+        </p:grpSpPr>
+        <p:pic>
+          <p:nvPicPr>
+            <p:cNvPr id="8" name="Picture 7">
+              <a:extLst>
+                <a:ext uri="{FF2B5EF4-FFF2-40B4-BE49-F238E27FC236}">
+                  <a16:creationId xmlns:a16="http://schemas.microsoft.com/office/drawing/2014/main" id="{961DE2F5-A562-0647-B2E2-A2A29190E88B}"/>
+                </a:ext>
+              </a:extLst>
+            </p:cNvPr>
+            <p:cNvPicPr>
+              <a:picLocks noChangeAspect="1"/>
+            </p:cNvPicPr>
+            <p:nvPr/>
+          </p:nvPicPr>
+          <p:blipFill>
+            <a:blip r:embed="rId2"/>
+            <a:stretch>
+              <a:fillRect/>
+            </a:stretch>
+          </p:blipFill>
+          <p:spPr>
+            <a:xfrm>
+              <a:off x="4242142" y="1405"/>
+              <a:ext cx="5374088" cy="6856595"/>
+            </a:xfrm>
+            <a:prstGeom prst="rect">
+              <a:avLst/>
+            </a:prstGeom>
+            <a:ln>
+              <a:solidFill>
+                <a:schemeClr val="tx1"/>
+              </a:solidFill>
+            </a:ln>
+          </p:spPr>
+        </p:pic>
+        <p:sp>
+          <p:nvSpPr>
+            <p:cNvPr id="9" name="Rectangle 8">
+              <a:extLst>
+                <a:ext uri="{FF2B5EF4-FFF2-40B4-BE49-F238E27FC236}">
+                  <a16:creationId xmlns:a16="http://schemas.microsoft.com/office/drawing/2014/main" id="{8E8000E1-D2F5-9842-BE02-E7DFC99342A6}"/>
+                </a:ext>
+              </a:extLst>
+            </p:cNvPr>
+            <p:cNvSpPr/>
+            <p:nvPr/>
+          </p:nvSpPr>
+          <p:spPr>
+            <a:xfrm>
+              <a:off x="4571999" y="5881816"/>
+              <a:ext cx="4784651" cy="784799"/>
+            </a:xfrm>
+            <a:prstGeom prst="rect">
+              <a:avLst/>
+            </a:prstGeom>
+            <a:solidFill>
+              <a:schemeClr val="bg1"/>
+            </a:solidFill>
+            <a:ln>
+              <a:noFill/>
+            </a:ln>
+          </p:spPr>
+          <p:style>
+            <a:lnRef idx="2">
+              <a:schemeClr val="accent1">
+                <a:shade val="50000"/>
+              </a:schemeClr>
+            </a:lnRef>
+            <a:fillRef idx="1">
+              <a:schemeClr val="accent1"/>
+            </a:fillRef>
+            <a:effectRef idx="0">
+              <a:schemeClr val="accent1"/>
+            </a:effectRef>
+            <a:fontRef idx="minor">
+              <a:schemeClr val="lt1"/>
+            </a:fontRef>
+          </p:style>
+          <p:txBody>
+            <a:bodyPr lIns="91440" rtlCol="0" anchor="ctr"/>
+            <a:lstStyle/>
+            <a:p>
+              <a:pPr algn="ctr"/>
+              <a:endParaRPr lang="en-US" dirty="0"/>
+            </a:p>
+          </p:txBody>
+        </p:sp>
+        <p:sp>
+          <p:nvSpPr>
+            <p:cNvPr id="10" name="TextBox 9">
+              <a:extLst>
+                <a:ext uri="{FF2B5EF4-FFF2-40B4-BE49-F238E27FC236}">
+                  <a16:creationId xmlns:a16="http://schemas.microsoft.com/office/drawing/2014/main" id="{225BE0DD-BF8B-744A-9CDE-7E00D6F3315D}"/>
+                </a:ext>
+              </a:extLst>
+            </p:cNvPr>
+            <p:cNvSpPr txBox="1"/>
+            <p:nvPr/>
+          </p:nvSpPr>
+          <p:spPr>
+            <a:xfrm>
+              <a:off x="6276534" y="4278186"/>
+              <a:ext cx="1359941" cy="677108"/>
+            </a:xfrm>
+            <a:prstGeom prst="rect">
+              <a:avLst/>
+            </a:prstGeom>
+            <a:noFill/>
+            <a:ln>
+              <a:noFill/>
+            </a:ln>
+          </p:spPr>
+          <p:txBody>
+            <a:bodyPr wrap="square" lIns="91440" rtlCol="0">
+              <a:spAutoFit/>
+            </a:bodyPr>
+            <a:lstStyle/>
+            <a:p>
+              <a:pPr algn="ctr"/>
+              <a:r>
+                <a:rPr lang="en-US" spc="100" dirty="0">
+                  <a:solidFill>
+                    <a:schemeClr val="bg1"/>
+                  </a:solidFill>
+                  <a:latin typeface="Impact" panose="020B0806030902050204" pitchFamily="34" charset="0"/>
+                </a:rPr>
+                <a:t>EVERYONE </a:t>
+              </a:r>
+            </a:p>
+            <a:p>
+              <a:pPr algn="ctr"/>
+              <a:r>
+                <a:rPr lang="en-US" sz="2000" spc="100" dirty="0">
+                  <a:solidFill>
+                    <a:schemeClr val="bg1"/>
+                  </a:solidFill>
+                  <a:latin typeface="Impact" panose="020B0806030902050204" pitchFamily="34" charset="0"/>
+                </a:rPr>
+                <a:t>WELCOME</a:t>
+              </a:r>
+              <a:endParaRPr lang="en-US" spc="100" dirty="0">
+                <a:solidFill>
+                  <a:schemeClr val="bg1"/>
+                </a:solidFill>
+                <a:latin typeface="Impact" panose="020B0806030902050204" pitchFamily="34" charset="0"/>
+              </a:endParaRPr>
+            </a:p>
+          </p:txBody>
+        </p:sp>
+        <p:sp>
+          <p:nvSpPr>
+            <p:cNvPr id="11" name="TextBox 10">
+              <a:extLst>
+                <a:ext uri="{FF2B5EF4-FFF2-40B4-BE49-F238E27FC236}">
+                  <a16:creationId xmlns:a16="http://schemas.microsoft.com/office/drawing/2014/main" id="{B1CE200D-0234-0C48-90DE-A386FE94A056}"/>
+                </a:ext>
+              </a:extLst>
+            </p:cNvPr>
+            <p:cNvSpPr txBox="1"/>
+            <p:nvPr/>
+          </p:nvSpPr>
+          <p:spPr>
+            <a:xfrm>
+              <a:off x="4571999" y="5832388"/>
+              <a:ext cx="4473147" cy="307777"/>
+            </a:xfrm>
+            <a:prstGeom prst="rect">
+              <a:avLst/>
+            </a:prstGeom>
+            <a:noFill/>
+          </p:spPr>
+          <p:txBody>
+            <a:bodyPr wrap="square" lIns="91440" rtlCol="0">
+              <a:spAutoFit/>
+            </a:bodyPr>
+            <a:lstStyle/>
+            <a:p>
+              <a:pPr algn="ctr"/>
+              <a:r>
+                <a:rPr lang="en-US" sz="1400" dirty="0">
+                  <a:latin typeface="Impact" panose="020B0806030902050204" pitchFamily="34" charset="0"/>
+                </a:rPr>
+                <a:t>Thursdays 4–7 PM @ Gentle Ben’s Brewing</a:t>
+              </a:r>
+            </a:p>
+          </p:txBody>
+        </p:sp>
+      </p:grpSp>
     </p:spTree>
     <p:extLst>
       <p:ext uri="{BB962C8B-B14F-4D97-AF65-F5344CB8AC3E}">

</xml_diff>